<commit_message>
PowerPoint and ML update
</commit_message>
<xml_diff>
--- a/Rising apartment prices in Gush Dan.pptx
+++ b/Rising apartment prices in Gush Dan.pptx
@@ -18496,6 +18496,11 @@
               <a:rPr lang="en" dirty="0"/>
               <a:t>Chen Yank</a:t>
             </a:r>
+            <a:r>
+              <a:rPr lang="en-US" dirty="0"/>
+              <a:t>o</a:t>
+            </a:r>
+            <a:endParaRPr lang="en" dirty="0"/>
           </a:p>
           <a:p>
             <a:pPr marL="0" lvl="0" indent="0" algn="ctr" rtl="0">
@@ -22422,10 +22427,10 @@
       </p:sp>
       <p:pic>
         <p:nvPicPr>
-          <p:cNvPr id="2" name="תמונה 1">
+          <p:cNvPr id="3" name="תמונה 2">
             <a:extLst>
               <a:ext uri="{FF2B5EF4-FFF2-40B4-BE49-F238E27FC236}">
-                <a16:creationId xmlns:a16="http://schemas.microsoft.com/office/drawing/2014/main" id="{2DA7C9B0-0570-48AB-AD02-C6E0775DA6E3}"/>
+                <a16:creationId xmlns:a16="http://schemas.microsoft.com/office/drawing/2014/main" id="{CAFA5057-3BDB-471E-8643-1D27BE8023E2}"/>
               </a:ext>
             </a:extLst>
           </p:cNvPr>
@@ -22442,8 +22447,8 @@
         </p:blipFill>
         <p:spPr>
           <a:xfrm>
-            <a:off x="882193" y="3047225"/>
-            <a:ext cx="7379613" cy="1087450"/>
+            <a:off x="1013460" y="2979534"/>
+            <a:ext cx="7185583" cy="1203845"/>
           </a:xfrm>
           <a:prstGeom prst="rect">
             <a:avLst/>

</xml_diff>